<commit_message>
Added pp version2 of holy scrummaster Leon
</commit_message>
<xml_diff>
--- a/documentation/dt_g5_spiegel_ai_praesentation_kranner.pptx
+++ b/documentation/dt_g5_spiegel_ai_praesentation_kranner.pptx
@@ -5,18 +5,20 @@
     <p:sldMasterId id="2147483660" r:id="rId4"/>
   </p:sldMasterIdLst>
   <p:notesMasterIdLst>
-    <p:notesMasterId r:id="rId11"/>
+    <p:notesMasterId r:id="rId13"/>
   </p:notesMasterIdLst>
   <p:handoutMasterIdLst>
-    <p:handoutMasterId r:id="rId12"/>
+    <p:handoutMasterId r:id="rId14"/>
   </p:handoutMasterIdLst>
   <p:sldIdLst>
-    <p:sldId id="275" r:id="rId5"/>
-    <p:sldId id="276" r:id="rId6"/>
-    <p:sldId id="277" r:id="rId7"/>
-    <p:sldId id="278" r:id="rId8"/>
-    <p:sldId id="279" r:id="rId9"/>
-    <p:sldId id="270" r:id="rId10"/>
+    <p:sldId id="274" r:id="rId5"/>
+    <p:sldId id="275" r:id="rId6"/>
+    <p:sldId id="276" r:id="rId7"/>
+    <p:sldId id="277" r:id="rId8"/>
+    <p:sldId id="283" r:id="rId9"/>
+    <p:sldId id="278" r:id="rId10"/>
+    <p:sldId id="279" r:id="rId11"/>
+    <p:sldId id="270" r:id="rId12"/>
   </p:sldIdLst>
   <p:sldSz cx="12188825" cy="6858000"/>
   <p:notesSz cx="6858000" cy="9144000"/>
@@ -230,7 +232,7 @@
           <a:p>
             <a:fld id="{FE5B4EDC-59C0-49C7-8ADA-5A781B329E02}" type="datetimeFigureOut">
               <a:rPr lang="en-US"/>
-              <a:t>7/1/2024</a:t>
+              <a:t>7/2/2024</a:t>
             </a:fld>
             <a:endParaRPr/>
           </a:p>
@@ -395,7 +397,7 @@
           <a:p>
             <a:fld id="{F2D8D46A-B586-417D-BFBD-8C8FE0AAF762}" type="datetimeFigureOut">
               <a:rPr lang="en-US"/>
-              <a:t>7/1/2024</a:t>
+              <a:t>7/2/2024</a:t>
             </a:fld>
             <a:endParaRPr/>
           </a:p>
@@ -733,7 +735,7 @@
           <a:p>
             <a:fld id="{3EBA5BD7-F043-4D1B-AA17-CD412FC534DE}" type="slidenum">
               <a:rPr lang="de-DE" smtClean="0"/>
-              <a:t>3</a:t>
+              <a:t>4</a:t>
             </a:fld>
             <a:endParaRPr lang="de-DE"/>
           </a:p>
@@ -901,7 +903,7 @@
           <a:p>
             <a:fld id="{3EBA5BD7-F043-4D1B-AA17-CD412FC534DE}" type="slidenum">
               <a:rPr lang="de-DE" smtClean="0"/>
-              <a:t>4</a:t>
+              <a:t>6</a:t>
             </a:fld>
             <a:endParaRPr lang="de-DE"/>
           </a:p>
@@ -1676,7 +1678,7 @@
           <a:p>
             <a:fld id="{C33B2E05-0D11-42BC-8271-EB7C8A66DC1A}" type="datetime1">
               <a:rPr lang="en-US" smtClean="0"/>
-              <a:t>7/1/2024</a:t>
+              <a:t>7/2/2024</a:t>
             </a:fld>
             <a:endParaRPr/>
           </a:p>
@@ -1878,7 +1880,7 @@
           <a:p>
             <a:fld id="{F194674F-D65D-4915-BA09-6E355F7424A3}" type="datetime1">
               <a:rPr lang="en-US" smtClean="0"/>
-              <a:t>7/1/2024</a:t>
+              <a:t>7/2/2024</a:t>
             </a:fld>
             <a:endParaRPr/>
           </a:p>
@@ -2090,7 +2092,7 @@
           <a:p>
             <a:fld id="{4B000729-B74C-4588-BF96-338B7D4252E2}" type="datetime1">
               <a:rPr lang="en-US" smtClean="0"/>
-              <a:t>7/1/2024</a:t>
+              <a:t>7/2/2024</a:t>
             </a:fld>
             <a:endParaRPr/>
           </a:p>
@@ -2292,7 +2294,7 @@
           <a:p>
             <a:fld id="{3CB9E113-3AC0-4042-8C77-BB4D3A12A3F0}" type="datetime1">
               <a:rPr lang="en-US" smtClean="0"/>
-              <a:t>7/1/2024</a:t>
+              <a:t>7/2/2024</a:t>
             </a:fld>
             <a:endParaRPr/>
           </a:p>
@@ -2728,7 +2730,7 @@
           <a:p>
             <a:fld id="{208933B6-84A5-44AF-AE8C-9C443363BF02}" type="datetime1">
               <a:rPr lang="en-US" smtClean="0"/>
-              <a:t>7/1/2024</a:t>
+              <a:t>7/2/2024</a:t>
             </a:fld>
             <a:endParaRPr/>
           </a:p>
@@ -3036,7 +3038,7 @@
           <a:p>
             <a:fld id="{8388490B-06C8-4E40-A765-EC0916748263}" type="datetime1">
               <a:rPr lang="en-US" smtClean="0"/>
-              <a:t>7/1/2024</a:t>
+              <a:t>7/2/2024</a:t>
             </a:fld>
             <a:endParaRPr/>
           </a:p>
@@ -3496,7 +3498,7 @@
           <a:p>
             <a:fld id="{353A933F-ADA4-4DBD-A5C8-929E50661281}" type="datetime1">
               <a:rPr lang="en-US" smtClean="0"/>
-              <a:t>7/1/2024</a:t>
+              <a:t>7/2/2024</a:t>
             </a:fld>
             <a:endParaRPr/>
           </a:p>
@@ -3630,7 +3632,7 @@
           <a:p>
             <a:fld id="{80E628C0-3082-427C-A880-3E7C97C0CF7B}" type="datetime1">
               <a:rPr lang="en-US" smtClean="0"/>
-              <a:t>7/1/2024</a:t>
+              <a:t>7/2/2024</a:t>
             </a:fld>
             <a:endParaRPr/>
           </a:p>
@@ -3741,7 +3743,7 @@
           <a:p>
             <a:fld id="{B464D24B-500D-4858-BD2C-58E5C5068BDD}" type="datetime1">
               <a:rPr lang="en-US" smtClean="0"/>
-              <a:t>7/1/2024</a:t>
+              <a:t>7/2/2024</a:t>
             </a:fld>
             <a:endParaRPr/>
           </a:p>
@@ -4044,7 +4046,7 @@
           <a:p>
             <a:fld id="{CBB568EF-3E7C-48AC-88B1-C9A78D9F28F6}" type="datetime1">
               <a:rPr lang="en-US" smtClean="0"/>
-              <a:t>7/1/2024</a:t>
+              <a:t>7/2/2024</a:t>
             </a:fld>
             <a:endParaRPr/>
           </a:p>
@@ -4336,7 +4338,7 @@
           <a:p>
             <a:fld id="{577AB779-446E-4C85-94A2-0AA259C3005C}" type="datetime1">
               <a:rPr lang="en-US" smtClean="0"/>
-              <a:t>7/1/2024</a:t>
+              <a:t>7/2/2024</a:t>
             </a:fld>
             <a:endParaRPr/>
           </a:p>
@@ -4962,7 +4964,7 @@
           <a:p>
             <a:fld id="{63CDA079-5386-4105-AE2C-FD272EFD4E4E}" type="datetime1">
               <a:rPr lang="en-US" smtClean="0"/>
-              <a:t>7/1/2024</a:t>
+              <a:t>7/2/2024</a:t>
             </a:fld>
             <a:endParaRPr/>
           </a:p>
@@ -5439,6 +5441,123 @@
       </p:grpSpPr>
       <p:sp>
         <p:nvSpPr>
+          <p:cNvPr id="2" name="Title 1"/>
+          <p:cNvSpPr>
+            <a:spLocks noGrp="1"/>
+          </p:cNvSpPr>
+          <p:nvPr>
+            <p:ph type="ctrTitle"/>
+          </p:nvPr>
+        </p:nvSpPr>
+        <p:spPr/>
+        <p:txBody>
+          <a:bodyPr/>
+          <a:lstStyle/>
+          <a:p>
+            <a:r>
+              <a:rPr lang="en-US" dirty="0"/>
+              <a:t>Spiegel AI </a:t>
+            </a:r>
+            <a:r>
+              <a:rPr lang="en-US" dirty="0" err="1"/>
+              <a:t>Rahmen</a:t>
+            </a:r>
+            <a:r>
+              <a:rPr lang="en-US" dirty="0"/>
+              <a:t> &amp; Hardware</a:t>
+            </a:r>
+          </a:p>
+        </p:txBody>
+      </p:sp>
+      <p:sp>
+        <p:nvSpPr>
+          <p:cNvPr id="5" name="Subtitle 4"/>
+          <p:cNvSpPr>
+            <a:spLocks noGrp="1"/>
+          </p:cNvSpPr>
+          <p:nvPr>
+            <p:ph type="subTitle" idx="1"/>
+          </p:nvPr>
+        </p:nvSpPr>
+        <p:spPr/>
+        <p:txBody>
+          <a:bodyPr/>
+          <a:lstStyle/>
+          <a:p>
+            <a:r>
+              <a:rPr lang="en-US" dirty="0"/>
+              <a:t>Leon </a:t>
+            </a:r>
+            <a:r>
+              <a:rPr lang="en-US" dirty="0" err="1"/>
+              <a:t>Kranner</a:t>
+            </a:r>
+            <a:r>
+              <a:rPr lang="en-US" dirty="0"/>
+              <a:t>, Marcel Wagner– 03.07.2024</a:t>
+            </a:r>
+          </a:p>
+          <a:p>
+            <a:r>
+              <a:rPr lang="en-US" dirty="0" err="1"/>
+              <a:t>Datenverarbeitung</a:t>
+            </a:r>
+            <a:r>
+              <a:rPr lang="en-US" dirty="0"/>
+              <a:t> in der </a:t>
+            </a:r>
+            <a:r>
+              <a:rPr lang="en-US" dirty="0" err="1"/>
+              <a:t>Technik</a:t>
+            </a:r>
+            <a:endParaRPr lang="en-US" dirty="0"/>
+          </a:p>
+        </p:txBody>
+      </p:sp>
+    </p:spTree>
+    <p:extLst>
+      <p:ext uri="{BB962C8B-B14F-4D97-AF65-F5344CB8AC3E}">
+        <p14:creationId xmlns:p14="http://schemas.microsoft.com/office/powerpoint/2010/main" val="2975804336"/>
+      </p:ext>
+    </p:extLst>
+  </p:cSld>
+  <p:clrMapOvr>
+    <a:masterClrMapping/>
+  </p:clrMapOvr>
+  <mc:AlternateContent xmlns:mc="http://schemas.openxmlformats.org/markup-compatibility/2006" xmlns:p14="http://schemas.microsoft.com/office/powerpoint/2010/main">
+    <mc:Choice Requires="p14">
+      <p:transition spd="med" p14:dur="700">
+        <p:fade/>
+      </p:transition>
+    </mc:Choice>
+    <mc:Fallback xmlns="">
+      <p:transition spd="med">
+        <p:fade/>
+      </p:transition>
+    </mc:Fallback>
+  </mc:AlternateContent>
+</p:sld>
+</file>
+
+<file path=ppt/slides/slide2.xml><?xml version="1.0" encoding="utf-8"?>
+<p:sld xmlns:a="http://schemas.openxmlformats.org/drawingml/2006/main" xmlns:r="http://schemas.openxmlformats.org/officeDocument/2006/relationships" xmlns:p="http://schemas.openxmlformats.org/presentationml/2006/main">
+  <p:cSld>
+    <p:spTree>
+      <p:nvGrpSpPr>
+        <p:cNvPr id="1" name=""/>
+        <p:cNvGrpSpPr/>
+        <p:nvPr/>
+      </p:nvGrpSpPr>
+      <p:grpSpPr>
+        <a:xfrm>
+          <a:off x="0" y="0"/>
+          <a:ext cx="0" cy="0"/>
+          <a:chOff x="0" y="0"/>
+          <a:chExt cx="0" cy="0"/>
+        </a:xfrm>
+      </p:grpSpPr>
+      <p:sp>
+        <p:nvSpPr>
           <p:cNvPr id="13" name="Title 12"/>
           <p:cNvSpPr>
             <a:spLocks noGrp="1"/>
@@ -5559,7 +5678,7 @@
           <a:p>
             <a:fld id="{C014DD1E-5D91-48A3-AD6D-45FBA980D106}" type="slidenum">
               <a:rPr lang="de-DE" smtClean="0"/>
-              <a:t>1</a:t>
+              <a:t>2</a:t>
             </a:fld>
             <a:endParaRPr lang="de-DE" dirty="0"/>
           </a:p>
@@ -5712,7 +5831,7 @@
 </p:sld>
 </file>
 
-<file path=ppt/slides/slide2.xml><?xml version="1.0" encoding="utf-8"?>
+<file path=ppt/slides/slide3.xml><?xml version="1.0" encoding="utf-8"?>
 <p:sld xmlns:a="http://schemas.openxmlformats.org/drawingml/2006/main" xmlns:r="http://schemas.openxmlformats.org/officeDocument/2006/relationships" xmlns:p="http://schemas.openxmlformats.org/presentationml/2006/main">
   <p:cSld>
     <p:spTree>
@@ -5837,7 +5956,7 @@
           <a:p>
             <a:fld id="{C014DD1E-5D91-48A3-AD6D-45FBA980D106}" type="slidenum">
               <a:rPr lang="de-DE" smtClean="0"/>
-              <a:t>2</a:t>
+              <a:t>3</a:t>
             </a:fld>
             <a:endParaRPr lang="de-DE" dirty="0"/>
           </a:p>
@@ -5974,7 +6093,7 @@
 </p:sld>
 </file>
 
-<file path=ppt/slides/slide3.xml><?xml version="1.0" encoding="utf-8"?>
+<file path=ppt/slides/slide4.xml><?xml version="1.0" encoding="utf-8"?>
 <p:sld xmlns:a="http://schemas.openxmlformats.org/drawingml/2006/main" xmlns:r="http://schemas.openxmlformats.org/officeDocument/2006/relationships" xmlns:p="http://schemas.openxmlformats.org/presentationml/2006/main">
   <p:cSld>
     <p:spTree>
@@ -6064,7 +6183,7 @@
           <a:p>
             <a:fld id="{C014DD1E-5D91-48A3-AD6D-45FBA980D106}" type="slidenum">
               <a:rPr lang="de-DE" smtClean="0"/>
-              <a:t>3</a:t>
+              <a:t>4</a:t>
             </a:fld>
             <a:endParaRPr lang="de-DE" dirty="0"/>
           </a:p>
@@ -6201,7 +6320,7 @@
 </p:sld>
 </file>
 
-<file path=ppt/slides/slide4.xml><?xml version="1.0" encoding="utf-8"?>
+<file path=ppt/slides/slide5.xml><?xml version="1.0" encoding="utf-8"?>
 <p:sld xmlns:a="http://schemas.openxmlformats.org/drawingml/2006/main" xmlns:r="http://schemas.openxmlformats.org/officeDocument/2006/relationships" xmlns:p="http://schemas.openxmlformats.org/presentationml/2006/main">
   <p:cSld>
     <p:spTree>
@@ -6220,6 +6339,125 @@
       </p:grpSpPr>
       <p:sp>
         <p:nvSpPr>
+          <p:cNvPr id="2" name="Title 1"/>
+          <p:cNvSpPr>
+            <a:spLocks noGrp="1"/>
+          </p:cNvSpPr>
+          <p:nvPr>
+            <p:ph type="ctrTitle"/>
+          </p:nvPr>
+        </p:nvSpPr>
+        <p:spPr/>
+        <p:txBody>
+          <a:bodyPr>
+            <a:normAutofit/>
+          </a:bodyPr>
+          <a:lstStyle/>
+          <a:p>
+            <a:r>
+              <a:rPr lang="en-US" dirty="0"/>
+              <a:t>Spiegel AI Display Setup / </a:t>
+            </a:r>
+            <a:r>
+              <a:rPr lang="en-US" dirty="0" err="1"/>
+              <a:t>Aufteilung</a:t>
+            </a:r>
+            <a:r>
+              <a:rPr lang="en-US" dirty="0"/>
+              <a:t> &amp; Widgets</a:t>
+            </a:r>
+          </a:p>
+        </p:txBody>
+      </p:sp>
+      <p:sp>
+        <p:nvSpPr>
+          <p:cNvPr id="5" name="Subtitle 4"/>
+          <p:cNvSpPr>
+            <a:spLocks noGrp="1"/>
+          </p:cNvSpPr>
+          <p:nvPr>
+            <p:ph type="subTitle" idx="1"/>
+          </p:nvPr>
+        </p:nvSpPr>
+        <p:spPr/>
+        <p:txBody>
+          <a:bodyPr/>
+          <a:lstStyle/>
+          <a:p>
+            <a:r>
+              <a:rPr lang="en-US" dirty="0"/>
+              <a:t>Leon </a:t>
+            </a:r>
+            <a:r>
+              <a:rPr lang="en-US" dirty="0" err="1"/>
+              <a:t>Kranner</a:t>
+            </a:r>
+            <a:r>
+              <a:rPr lang="en-US" dirty="0"/>
+              <a:t>– 03.07.2024</a:t>
+            </a:r>
+          </a:p>
+          <a:p>
+            <a:r>
+              <a:rPr lang="en-US" dirty="0" err="1"/>
+              <a:t>Datenverarbeitung</a:t>
+            </a:r>
+            <a:r>
+              <a:rPr lang="en-US" dirty="0"/>
+              <a:t> in der </a:t>
+            </a:r>
+            <a:r>
+              <a:rPr lang="en-US" dirty="0" err="1"/>
+              <a:t>Technik</a:t>
+            </a:r>
+            <a:endParaRPr lang="en-US" dirty="0"/>
+          </a:p>
+        </p:txBody>
+      </p:sp>
+    </p:spTree>
+    <p:extLst>
+      <p:ext uri="{BB962C8B-B14F-4D97-AF65-F5344CB8AC3E}">
+        <p14:creationId xmlns:p14="http://schemas.microsoft.com/office/powerpoint/2010/main" val="3850100245"/>
+      </p:ext>
+    </p:extLst>
+  </p:cSld>
+  <p:clrMapOvr>
+    <a:masterClrMapping/>
+  </p:clrMapOvr>
+  <mc:AlternateContent xmlns:mc="http://schemas.openxmlformats.org/markup-compatibility/2006" xmlns:p14="http://schemas.microsoft.com/office/powerpoint/2010/main">
+    <mc:Choice Requires="p14">
+      <p:transition spd="med" p14:dur="700">
+        <p:fade/>
+      </p:transition>
+    </mc:Choice>
+    <mc:Fallback xmlns="">
+      <p:transition spd="med">
+        <p:fade/>
+      </p:transition>
+    </mc:Fallback>
+  </mc:AlternateContent>
+</p:sld>
+</file>
+
+<file path=ppt/slides/slide6.xml><?xml version="1.0" encoding="utf-8"?>
+<p:sld xmlns:a="http://schemas.openxmlformats.org/drawingml/2006/main" xmlns:r="http://schemas.openxmlformats.org/officeDocument/2006/relationships" xmlns:p="http://schemas.openxmlformats.org/presentationml/2006/main">
+  <p:cSld>
+    <p:spTree>
+      <p:nvGrpSpPr>
+        <p:cNvPr id="1" name=""/>
+        <p:cNvGrpSpPr/>
+        <p:nvPr/>
+      </p:nvGrpSpPr>
+      <p:grpSpPr>
+        <a:xfrm>
+          <a:off x="0" y="0"/>
+          <a:ext cx="0" cy="0"/>
+          <a:chOff x="0" y="0"/>
+          <a:chExt cx="0" cy="0"/>
+        </a:xfrm>
+      </p:grpSpPr>
+      <p:sp>
+        <p:nvSpPr>
           <p:cNvPr id="13" name="Title 12"/>
           <p:cNvSpPr>
             <a:spLocks noGrp="1"/>
@@ -6353,7 +6591,7 @@
           <a:p>
             <a:fld id="{C014DD1E-5D91-48A3-AD6D-45FBA980D106}" type="slidenum">
               <a:rPr lang="de-DE" smtClean="0"/>
-              <a:t>4</a:t>
+              <a:t>6</a:t>
             </a:fld>
             <a:endParaRPr lang="de-DE" dirty="0"/>
           </a:p>
@@ -6414,7 +6652,7 @@
 </p:sld>
 </file>
 
-<file path=ppt/slides/slide5.xml><?xml version="1.0" encoding="utf-8"?>
+<file path=ppt/slides/slide7.xml><?xml version="1.0" encoding="utf-8"?>
 <p:sld xmlns:a="http://schemas.openxmlformats.org/drawingml/2006/main" xmlns:r="http://schemas.openxmlformats.org/officeDocument/2006/relationships" xmlns:p="http://schemas.openxmlformats.org/presentationml/2006/main">
   <p:cSld>
     <p:spTree>
@@ -6552,7 +6790,7 @@
           <a:p>
             <a:fld id="{C014DD1E-5D91-48A3-AD6D-45FBA980D106}" type="slidenum">
               <a:rPr lang="de-DE" smtClean="0"/>
-              <a:t>5</a:t>
+              <a:t>7</a:t>
             </a:fld>
             <a:endParaRPr lang="de-DE" dirty="0"/>
           </a:p>
@@ -6703,7 +6941,7 @@
 </p:sld>
 </file>
 
-<file path=ppt/slides/slide6.xml><?xml version="1.0" encoding="utf-8"?>
+<file path=ppt/slides/slide8.xml><?xml version="1.0" encoding="utf-8"?>
 <p:sld xmlns:a="http://schemas.openxmlformats.org/drawingml/2006/main" xmlns:r="http://schemas.openxmlformats.org/officeDocument/2006/relationships" xmlns:p="http://schemas.openxmlformats.org/presentationml/2006/main">
   <p:cSld>
     <p:spTree>
@@ -6947,7 +7185,7 @@
           <a:p>
             <a:fld id="{C014DD1E-5D91-48A3-AD6D-45FBA980D106}" type="slidenum">
               <a:rPr lang="de-DE" smtClean="0"/>
-              <a:t>6</a:t>
+              <a:t>8</a:t>
             </a:fld>
             <a:endParaRPr lang="de-DE"/>
           </a:p>
@@ -7929,12 +8167,139 @@
 </file>
 
 <file path=customXml/item1.xml><?xml version="1.0" encoding="utf-8"?>
-<?mso-contentType ?>
-<FormTemplates xmlns="http://schemas.microsoft.com/sharepoint/v3/contenttype/forms">
-  <Display>DocumentLibraryForm</Display>
-  <Edit>AssetEditForm</Edit>
-  <New>DocumentLibraryForm</New>
-</FormTemplates>
+<p:properties xmlns:p="http://schemas.microsoft.com/office/2006/metadata/properties" xmlns:xsi="http://www.w3.org/2001/XMLSchema-instance" xmlns:pc="http://schemas.microsoft.com/office/infopath/2007/PartnerControls">
+  <documentManagement>
+    <LocPublishedLinkedAssetsLookup xmlns="4873beb7-5857-4685-be1f-d57550cc96cc" xsi:nil="true"/>
+    <ApprovalStatus xmlns="4873beb7-5857-4685-be1f-d57550cc96cc">InProgress</ApprovalStatus>
+    <MarketSpecific xmlns="4873beb7-5857-4685-be1f-d57550cc96cc">false</MarketSpecific>
+    <LocComments xmlns="4873beb7-5857-4685-be1f-d57550cc96cc" xsi:nil="true"/>
+    <LocLastLocAttemptVersionTypeLookup xmlns="4873beb7-5857-4685-be1f-d57550cc96cc" xsi:nil="true"/>
+    <DirectSourceMarket xmlns="4873beb7-5857-4685-be1f-d57550cc96cc" xsi:nil="true"/>
+    <ThumbnailAssetId xmlns="4873beb7-5857-4685-be1f-d57550cc96cc" xsi:nil="true"/>
+    <PrimaryImageGen xmlns="4873beb7-5857-4685-be1f-d57550cc96cc">false</PrimaryImageGen>
+    <LocNewPublishedVersionLookup xmlns="4873beb7-5857-4685-be1f-d57550cc96cc" xsi:nil="true"/>
+    <LegacyData xmlns="4873beb7-5857-4685-be1f-d57550cc96cc" xsi:nil="true"/>
+    <LocRecommendedHandoff xmlns="4873beb7-5857-4685-be1f-d57550cc96cc" xsi:nil="true"/>
+    <BusinessGroup xmlns="4873beb7-5857-4685-be1f-d57550cc96cc" xsi:nil="true"/>
+    <BlockPublish xmlns="4873beb7-5857-4685-be1f-d57550cc96cc">false</BlockPublish>
+    <TPFriendlyName xmlns="4873beb7-5857-4685-be1f-d57550cc96cc" xsi:nil="true"/>
+    <LocOverallPublishStatusLookup xmlns="4873beb7-5857-4685-be1f-d57550cc96cc" xsi:nil="true"/>
+    <NumericId xmlns="4873beb7-5857-4685-be1f-d57550cc96cc" xsi:nil="true"/>
+    <APEditor xmlns="4873beb7-5857-4685-be1f-d57550cc96cc">
+      <UserInfo>
+        <DisplayName/>
+        <AccountId xsi:nil="true"/>
+        <AccountType/>
+      </UserInfo>
+    </APEditor>
+    <SourceTitle xmlns="4873beb7-5857-4685-be1f-d57550cc96cc" xsi:nil="true"/>
+    <OpenTemplate xmlns="4873beb7-5857-4685-be1f-d57550cc96cc">true</OpenTemplate>
+    <LocOverallLocStatusLookup xmlns="4873beb7-5857-4685-be1f-d57550cc96cc" xsi:nil="true"/>
+    <UALocComments xmlns="4873beb7-5857-4685-be1f-d57550cc96cc" xsi:nil="true"/>
+    <ParentAssetId xmlns="4873beb7-5857-4685-be1f-d57550cc96cc" xsi:nil="true"/>
+    <IntlLangReviewDate xmlns="4873beb7-5857-4685-be1f-d57550cc96cc" xsi:nil="true"/>
+    <FeatureTagsTaxHTField0 xmlns="4873beb7-5857-4685-be1f-d57550cc96cc">
+      <Terms xmlns="http://schemas.microsoft.com/office/infopath/2007/PartnerControls"/>
+    </FeatureTagsTaxHTField0>
+    <PublishStatusLookup xmlns="4873beb7-5857-4685-be1f-d57550cc96cc">
+      <Value>1345093</Value>
+    </PublishStatusLookup>
+    <Providers xmlns="4873beb7-5857-4685-be1f-d57550cc96cc" xsi:nil="true"/>
+    <MachineTranslated xmlns="4873beb7-5857-4685-be1f-d57550cc96cc">false</MachineTranslated>
+    <OriginalSourceMarket xmlns="4873beb7-5857-4685-be1f-d57550cc96cc" xsi:nil="true"/>
+    <APDescription xmlns="4873beb7-5857-4685-be1f-d57550cc96cc">This simple template design works for technology and  businesses, but it's versatile enough to use in other contexts.  It features multiple slide layouts designed for widescreen (16x9 resolution) and includes a sample SmartArt list and chart that are easily editable.</APDescription>
+    <ClipArtFilename xmlns="4873beb7-5857-4685-be1f-d57550cc96cc" xsi:nil="true"/>
+    <ContentItem xmlns="4873beb7-5857-4685-be1f-d57550cc96cc" xsi:nil="true"/>
+    <TPInstallLocation xmlns="4873beb7-5857-4685-be1f-d57550cc96cc" xsi:nil="true"/>
+    <PublishTargets xmlns="4873beb7-5857-4685-be1f-d57550cc96cc">OfficeOnlineVNext</PublishTargets>
+    <TimesCloned xmlns="4873beb7-5857-4685-be1f-d57550cc96cc" xsi:nil="true"/>
+    <AssetStart xmlns="4873beb7-5857-4685-be1f-d57550cc96cc">2011-11-26T00:30:00+00:00</AssetStart>
+    <Provider xmlns="4873beb7-5857-4685-be1f-d57550cc96cc" xsi:nil="true"/>
+    <AcquiredFrom xmlns="4873beb7-5857-4685-be1f-d57550cc96cc">Internal MS</AcquiredFrom>
+    <FriendlyTitle xmlns="4873beb7-5857-4685-be1f-d57550cc96cc" xsi:nil="true"/>
+    <LastHandOff xmlns="4873beb7-5857-4685-be1f-d57550cc96cc" xsi:nil="true"/>
+    <TPClientViewer xmlns="4873beb7-5857-4685-be1f-d57550cc96cc" xsi:nil="true"/>
+    <TemplateStatus xmlns="4873beb7-5857-4685-be1f-d57550cc96cc">Complete</TemplateStatus>
+    <Downloads xmlns="4873beb7-5857-4685-be1f-d57550cc96cc">0</Downloads>
+    <OOCacheId xmlns="4873beb7-5857-4685-be1f-d57550cc96cc" xsi:nil="true"/>
+    <IsDeleted xmlns="4873beb7-5857-4685-be1f-d57550cc96cc">false</IsDeleted>
+    <LocPublishedDependentAssetsLookup xmlns="4873beb7-5857-4685-be1f-d57550cc96cc" xsi:nil="true"/>
+    <TPExecutable xmlns="4873beb7-5857-4685-be1f-d57550cc96cc" xsi:nil="true"/>
+    <EditorialTags xmlns="4873beb7-5857-4685-be1f-d57550cc96cc" xsi:nil="true"/>
+    <SubmitterId xmlns="4873beb7-5857-4685-be1f-d57550cc96cc" xsi:nil="true"/>
+    <ApprovalLog xmlns="4873beb7-5857-4685-be1f-d57550cc96cc" xsi:nil="true"/>
+    <AssetType xmlns="4873beb7-5857-4685-be1f-d57550cc96cc">TP</AssetType>
+    <BugNumber xmlns="4873beb7-5857-4685-be1f-d57550cc96cc" xsi:nil="true"/>
+    <CSXSubmissionDate xmlns="4873beb7-5857-4685-be1f-d57550cc96cc" xsi:nil="true"/>
+    <CSXUpdate xmlns="4873beb7-5857-4685-be1f-d57550cc96cc">false</CSXUpdate>
+    <Milestone xmlns="4873beb7-5857-4685-be1f-d57550cc96cc" xsi:nil="true"/>
+    <RecommendationsModifier xmlns="4873beb7-5857-4685-be1f-d57550cc96cc" xsi:nil="true"/>
+    <OriginAsset xmlns="4873beb7-5857-4685-be1f-d57550cc96cc" xsi:nil="true"/>
+    <TPComponent xmlns="4873beb7-5857-4685-be1f-d57550cc96cc" xsi:nil="true"/>
+    <AssetId xmlns="4873beb7-5857-4685-be1f-d57550cc96cc">TP102787989</AssetId>
+    <IntlLocPriority xmlns="4873beb7-5857-4685-be1f-d57550cc96cc" xsi:nil="true"/>
+    <PolicheckWords xmlns="4873beb7-5857-4685-be1f-d57550cc96cc" xsi:nil="true"/>
+    <TPLaunchHelpLink xmlns="4873beb7-5857-4685-be1f-d57550cc96cc" xsi:nil="true"/>
+    <TPApplication xmlns="4873beb7-5857-4685-be1f-d57550cc96cc" xsi:nil="true"/>
+    <CrawlForDependencies xmlns="4873beb7-5857-4685-be1f-d57550cc96cc">false</CrawlForDependencies>
+    <HandoffToMSDN xmlns="4873beb7-5857-4685-be1f-d57550cc96cc" xsi:nil="true"/>
+    <PlannedPubDate xmlns="4873beb7-5857-4685-be1f-d57550cc96cc" xsi:nil="true"/>
+    <IntlLangReviewer xmlns="4873beb7-5857-4685-be1f-d57550cc96cc" xsi:nil="true"/>
+    <TrustLevel xmlns="4873beb7-5857-4685-be1f-d57550cc96cc">1 Microsoft Managed Content</TrustLevel>
+    <LocLastLocAttemptVersionLookup xmlns="4873beb7-5857-4685-be1f-d57550cc96cc">694266</LocLastLocAttemptVersionLookup>
+    <LocProcessedForHandoffsLookup xmlns="4873beb7-5857-4685-be1f-d57550cc96cc" xsi:nil="true"/>
+    <IsSearchable xmlns="4873beb7-5857-4685-be1f-d57550cc96cc">true</IsSearchable>
+    <TemplateTemplateType xmlns="4873beb7-5857-4685-be1f-d57550cc96cc">PowerPoint Presentation Template</TemplateTemplateType>
+    <CampaignTagsTaxHTField0 xmlns="4873beb7-5857-4685-be1f-d57550cc96cc">
+      <Terms xmlns="http://schemas.microsoft.com/office/infopath/2007/PartnerControls"/>
+    </CampaignTagsTaxHTField0>
+    <TPNamespace xmlns="4873beb7-5857-4685-be1f-d57550cc96cc" xsi:nil="true"/>
+    <LocOverallPreviewStatusLookup xmlns="4873beb7-5857-4685-be1f-d57550cc96cc" xsi:nil="true"/>
+    <TaxCatchAll xmlns="4873beb7-5857-4685-be1f-d57550cc96cc"/>
+    <Markets xmlns="4873beb7-5857-4685-be1f-d57550cc96cc"/>
+    <UAProjectedTotalWords xmlns="4873beb7-5857-4685-be1f-d57550cc96cc" xsi:nil="true"/>
+    <IntlLangReview xmlns="4873beb7-5857-4685-be1f-d57550cc96cc" xsi:nil="true"/>
+    <OutputCachingOn xmlns="4873beb7-5857-4685-be1f-d57550cc96cc">false</OutputCachingOn>
+    <AverageRating xmlns="4873beb7-5857-4685-be1f-d57550cc96cc" xsi:nil="true"/>
+    <APAuthor xmlns="4873beb7-5857-4685-be1f-d57550cc96cc">
+      <UserInfo>
+        <DisplayName>REDMOND\kristaa</DisplayName>
+        <AccountId>136</AccountId>
+        <AccountType/>
+      </UserInfo>
+    </APAuthor>
+    <LocManualTestRequired xmlns="4873beb7-5857-4685-be1f-d57550cc96cc">false</LocManualTestRequired>
+    <TPCommandLine xmlns="4873beb7-5857-4685-be1f-d57550cc96cc" xsi:nil="true"/>
+    <TPAppVersion xmlns="4873beb7-5857-4685-be1f-d57550cc96cc" xsi:nil="true"/>
+    <EditorialStatus xmlns="4873beb7-5857-4685-be1f-d57550cc96cc">Complete</EditorialStatus>
+    <LastModifiedDateTime xmlns="4873beb7-5857-4685-be1f-d57550cc96cc" xsi:nil="true"/>
+    <ScenarioTagsTaxHTField0 xmlns="4873beb7-5857-4685-be1f-d57550cc96cc">
+      <Terms xmlns="http://schemas.microsoft.com/office/infopath/2007/PartnerControls"/>
+    </ScenarioTagsTaxHTField0>
+    <LocProcessedForMarketsLookup xmlns="4873beb7-5857-4685-be1f-d57550cc96cc" xsi:nil="true"/>
+    <TPLaunchHelpLinkType xmlns="4873beb7-5857-4685-be1f-d57550cc96cc">Template</TPLaunchHelpLinkType>
+    <OriginalRelease xmlns="4873beb7-5857-4685-be1f-d57550cc96cc">15</OriginalRelease>
+    <LocalizationTagsTaxHTField0 xmlns="4873beb7-5857-4685-be1f-d57550cc96cc">
+      <Terms xmlns="http://schemas.microsoft.com/office/infopath/2007/PartnerControls"/>
+    </LocalizationTagsTaxHTField0>
+    <UACurrentWords xmlns="4873beb7-5857-4685-be1f-d57550cc96cc" xsi:nil="true"/>
+    <ArtSampleDocs xmlns="4873beb7-5857-4685-be1f-d57550cc96cc" xsi:nil="true"/>
+    <UALocRecommendation xmlns="4873beb7-5857-4685-be1f-d57550cc96cc">Localize</UALocRecommendation>
+    <Manager xmlns="4873beb7-5857-4685-be1f-d57550cc96cc" xsi:nil="true"/>
+    <LocOverallHandbackStatusLookup xmlns="4873beb7-5857-4685-be1f-d57550cc96cc" xsi:nil="true"/>
+    <ShowIn xmlns="4873beb7-5857-4685-be1f-d57550cc96cc">Show everywhere</ShowIn>
+    <UANotes xmlns="4873beb7-5857-4685-be1f-d57550cc96cc" xsi:nil="true"/>
+    <InternalTagsTaxHTField0 xmlns="4873beb7-5857-4685-be1f-d57550cc96cc">
+      <Terms xmlns="http://schemas.microsoft.com/office/infopath/2007/PartnerControls"/>
+    </InternalTagsTaxHTField0>
+    <CSXHash xmlns="4873beb7-5857-4685-be1f-d57550cc96cc" xsi:nil="true"/>
+    <VoteCount xmlns="4873beb7-5857-4685-be1f-d57550cc96cc" xsi:nil="true"/>
+    <AssetExpire xmlns="4873beb7-5857-4685-be1f-d57550cc96cc">2029-05-12T07:00:00+00:00</AssetExpire>
+    <DSATActionTaken xmlns="4873beb7-5857-4685-be1f-d57550cc96cc" xsi:nil="true"/>
+    <CSXSubmissionMarket xmlns="4873beb7-5857-4685-be1f-d57550cc96cc" xsi:nil="true"/>
+    <LocMarketGroupTiers2 xmlns="4873beb7-5857-4685-be1f-d57550cc96cc" xsi:nil="true"/>
+  </documentManagement>
+</p:properties>
 </file>
 
 <file path=customXml/item2.xml><?xml version="1.0" encoding="utf-8"?>
@@ -8978,145 +9343,26 @@
 </file>
 
 <file path=customXml/item3.xml><?xml version="1.0" encoding="utf-8"?>
-<p:properties xmlns:p="http://schemas.microsoft.com/office/2006/metadata/properties" xmlns:xsi="http://www.w3.org/2001/XMLSchema-instance" xmlns:pc="http://schemas.microsoft.com/office/infopath/2007/PartnerControls">
-  <documentManagement>
-    <LocPublishedLinkedAssetsLookup xmlns="4873beb7-5857-4685-be1f-d57550cc96cc" xsi:nil="true"/>
-    <ApprovalStatus xmlns="4873beb7-5857-4685-be1f-d57550cc96cc">InProgress</ApprovalStatus>
-    <MarketSpecific xmlns="4873beb7-5857-4685-be1f-d57550cc96cc">false</MarketSpecific>
-    <LocComments xmlns="4873beb7-5857-4685-be1f-d57550cc96cc" xsi:nil="true"/>
-    <LocLastLocAttemptVersionTypeLookup xmlns="4873beb7-5857-4685-be1f-d57550cc96cc" xsi:nil="true"/>
-    <DirectSourceMarket xmlns="4873beb7-5857-4685-be1f-d57550cc96cc" xsi:nil="true"/>
-    <ThumbnailAssetId xmlns="4873beb7-5857-4685-be1f-d57550cc96cc" xsi:nil="true"/>
-    <PrimaryImageGen xmlns="4873beb7-5857-4685-be1f-d57550cc96cc">false</PrimaryImageGen>
-    <LocNewPublishedVersionLookup xmlns="4873beb7-5857-4685-be1f-d57550cc96cc" xsi:nil="true"/>
-    <LegacyData xmlns="4873beb7-5857-4685-be1f-d57550cc96cc" xsi:nil="true"/>
-    <LocRecommendedHandoff xmlns="4873beb7-5857-4685-be1f-d57550cc96cc" xsi:nil="true"/>
-    <BusinessGroup xmlns="4873beb7-5857-4685-be1f-d57550cc96cc" xsi:nil="true"/>
-    <BlockPublish xmlns="4873beb7-5857-4685-be1f-d57550cc96cc">false</BlockPublish>
-    <TPFriendlyName xmlns="4873beb7-5857-4685-be1f-d57550cc96cc" xsi:nil="true"/>
-    <LocOverallPublishStatusLookup xmlns="4873beb7-5857-4685-be1f-d57550cc96cc" xsi:nil="true"/>
-    <NumericId xmlns="4873beb7-5857-4685-be1f-d57550cc96cc" xsi:nil="true"/>
-    <APEditor xmlns="4873beb7-5857-4685-be1f-d57550cc96cc">
-      <UserInfo>
-        <DisplayName/>
-        <AccountId xsi:nil="true"/>
-        <AccountType/>
-      </UserInfo>
-    </APEditor>
-    <SourceTitle xmlns="4873beb7-5857-4685-be1f-d57550cc96cc" xsi:nil="true"/>
-    <OpenTemplate xmlns="4873beb7-5857-4685-be1f-d57550cc96cc">true</OpenTemplate>
-    <LocOverallLocStatusLookup xmlns="4873beb7-5857-4685-be1f-d57550cc96cc" xsi:nil="true"/>
-    <UALocComments xmlns="4873beb7-5857-4685-be1f-d57550cc96cc" xsi:nil="true"/>
-    <ParentAssetId xmlns="4873beb7-5857-4685-be1f-d57550cc96cc" xsi:nil="true"/>
-    <IntlLangReviewDate xmlns="4873beb7-5857-4685-be1f-d57550cc96cc" xsi:nil="true"/>
-    <FeatureTagsTaxHTField0 xmlns="4873beb7-5857-4685-be1f-d57550cc96cc">
-      <Terms xmlns="http://schemas.microsoft.com/office/infopath/2007/PartnerControls"/>
-    </FeatureTagsTaxHTField0>
-    <PublishStatusLookup xmlns="4873beb7-5857-4685-be1f-d57550cc96cc">
-      <Value>1345093</Value>
-    </PublishStatusLookup>
-    <Providers xmlns="4873beb7-5857-4685-be1f-d57550cc96cc" xsi:nil="true"/>
-    <MachineTranslated xmlns="4873beb7-5857-4685-be1f-d57550cc96cc">false</MachineTranslated>
-    <OriginalSourceMarket xmlns="4873beb7-5857-4685-be1f-d57550cc96cc" xsi:nil="true"/>
-    <APDescription xmlns="4873beb7-5857-4685-be1f-d57550cc96cc">This simple template design works for technology and  businesses, but it's versatile enough to use in other contexts.  It features multiple slide layouts designed for widescreen (16x9 resolution) and includes a sample SmartArt list and chart that are easily editable.</APDescription>
-    <ClipArtFilename xmlns="4873beb7-5857-4685-be1f-d57550cc96cc" xsi:nil="true"/>
-    <ContentItem xmlns="4873beb7-5857-4685-be1f-d57550cc96cc" xsi:nil="true"/>
-    <TPInstallLocation xmlns="4873beb7-5857-4685-be1f-d57550cc96cc" xsi:nil="true"/>
-    <PublishTargets xmlns="4873beb7-5857-4685-be1f-d57550cc96cc">OfficeOnlineVNext</PublishTargets>
-    <TimesCloned xmlns="4873beb7-5857-4685-be1f-d57550cc96cc" xsi:nil="true"/>
-    <AssetStart xmlns="4873beb7-5857-4685-be1f-d57550cc96cc">2011-11-26T00:30:00+00:00</AssetStart>
-    <Provider xmlns="4873beb7-5857-4685-be1f-d57550cc96cc" xsi:nil="true"/>
-    <AcquiredFrom xmlns="4873beb7-5857-4685-be1f-d57550cc96cc">Internal MS</AcquiredFrom>
-    <FriendlyTitle xmlns="4873beb7-5857-4685-be1f-d57550cc96cc" xsi:nil="true"/>
-    <LastHandOff xmlns="4873beb7-5857-4685-be1f-d57550cc96cc" xsi:nil="true"/>
-    <TPClientViewer xmlns="4873beb7-5857-4685-be1f-d57550cc96cc" xsi:nil="true"/>
-    <TemplateStatus xmlns="4873beb7-5857-4685-be1f-d57550cc96cc">Complete</TemplateStatus>
-    <Downloads xmlns="4873beb7-5857-4685-be1f-d57550cc96cc">0</Downloads>
-    <OOCacheId xmlns="4873beb7-5857-4685-be1f-d57550cc96cc" xsi:nil="true"/>
-    <IsDeleted xmlns="4873beb7-5857-4685-be1f-d57550cc96cc">false</IsDeleted>
-    <LocPublishedDependentAssetsLookup xmlns="4873beb7-5857-4685-be1f-d57550cc96cc" xsi:nil="true"/>
-    <TPExecutable xmlns="4873beb7-5857-4685-be1f-d57550cc96cc" xsi:nil="true"/>
-    <EditorialTags xmlns="4873beb7-5857-4685-be1f-d57550cc96cc" xsi:nil="true"/>
-    <SubmitterId xmlns="4873beb7-5857-4685-be1f-d57550cc96cc" xsi:nil="true"/>
-    <ApprovalLog xmlns="4873beb7-5857-4685-be1f-d57550cc96cc" xsi:nil="true"/>
-    <AssetType xmlns="4873beb7-5857-4685-be1f-d57550cc96cc">TP</AssetType>
-    <BugNumber xmlns="4873beb7-5857-4685-be1f-d57550cc96cc" xsi:nil="true"/>
-    <CSXSubmissionDate xmlns="4873beb7-5857-4685-be1f-d57550cc96cc" xsi:nil="true"/>
-    <CSXUpdate xmlns="4873beb7-5857-4685-be1f-d57550cc96cc">false</CSXUpdate>
-    <Milestone xmlns="4873beb7-5857-4685-be1f-d57550cc96cc" xsi:nil="true"/>
-    <RecommendationsModifier xmlns="4873beb7-5857-4685-be1f-d57550cc96cc" xsi:nil="true"/>
-    <OriginAsset xmlns="4873beb7-5857-4685-be1f-d57550cc96cc" xsi:nil="true"/>
-    <TPComponent xmlns="4873beb7-5857-4685-be1f-d57550cc96cc" xsi:nil="true"/>
-    <AssetId xmlns="4873beb7-5857-4685-be1f-d57550cc96cc">TP102787989</AssetId>
-    <IntlLocPriority xmlns="4873beb7-5857-4685-be1f-d57550cc96cc" xsi:nil="true"/>
-    <PolicheckWords xmlns="4873beb7-5857-4685-be1f-d57550cc96cc" xsi:nil="true"/>
-    <TPLaunchHelpLink xmlns="4873beb7-5857-4685-be1f-d57550cc96cc" xsi:nil="true"/>
-    <TPApplication xmlns="4873beb7-5857-4685-be1f-d57550cc96cc" xsi:nil="true"/>
-    <CrawlForDependencies xmlns="4873beb7-5857-4685-be1f-d57550cc96cc">false</CrawlForDependencies>
-    <HandoffToMSDN xmlns="4873beb7-5857-4685-be1f-d57550cc96cc" xsi:nil="true"/>
-    <PlannedPubDate xmlns="4873beb7-5857-4685-be1f-d57550cc96cc" xsi:nil="true"/>
-    <IntlLangReviewer xmlns="4873beb7-5857-4685-be1f-d57550cc96cc" xsi:nil="true"/>
-    <TrustLevel xmlns="4873beb7-5857-4685-be1f-d57550cc96cc">1 Microsoft Managed Content</TrustLevel>
-    <LocLastLocAttemptVersionLookup xmlns="4873beb7-5857-4685-be1f-d57550cc96cc">694266</LocLastLocAttemptVersionLookup>
-    <LocProcessedForHandoffsLookup xmlns="4873beb7-5857-4685-be1f-d57550cc96cc" xsi:nil="true"/>
-    <IsSearchable xmlns="4873beb7-5857-4685-be1f-d57550cc96cc">true</IsSearchable>
-    <TemplateTemplateType xmlns="4873beb7-5857-4685-be1f-d57550cc96cc">PowerPoint Presentation Template</TemplateTemplateType>
-    <CampaignTagsTaxHTField0 xmlns="4873beb7-5857-4685-be1f-d57550cc96cc">
-      <Terms xmlns="http://schemas.microsoft.com/office/infopath/2007/PartnerControls"/>
-    </CampaignTagsTaxHTField0>
-    <TPNamespace xmlns="4873beb7-5857-4685-be1f-d57550cc96cc" xsi:nil="true"/>
-    <LocOverallPreviewStatusLookup xmlns="4873beb7-5857-4685-be1f-d57550cc96cc" xsi:nil="true"/>
-    <TaxCatchAll xmlns="4873beb7-5857-4685-be1f-d57550cc96cc"/>
-    <Markets xmlns="4873beb7-5857-4685-be1f-d57550cc96cc"/>
-    <UAProjectedTotalWords xmlns="4873beb7-5857-4685-be1f-d57550cc96cc" xsi:nil="true"/>
-    <IntlLangReview xmlns="4873beb7-5857-4685-be1f-d57550cc96cc" xsi:nil="true"/>
-    <OutputCachingOn xmlns="4873beb7-5857-4685-be1f-d57550cc96cc">false</OutputCachingOn>
-    <AverageRating xmlns="4873beb7-5857-4685-be1f-d57550cc96cc" xsi:nil="true"/>
-    <APAuthor xmlns="4873beb7-5857-4685-be1f-d57550cc96cc">
-      <UserInfo>
-        <DisplayName>REDMOND\kristaa</DisplayName>
-        <AccountId>136</AccountId>
-        <AccountType/>
-      </UserInfo>
-    </APAuthor>
-    <LocManualTestRequired xmlns="4873beb7-5857-4685-be1f-d57550cc96cc">false</LocManualTestRequired>
-    <TPCommandLine xmlns="4873beb7-5857-4685-be1f-d57550cc96cc" xsi:nil="true"/>
-    <TPAppVersion xmlns="4873beb7-5857-4685-be1f-d57550cc96cc" xsi:nil="true"/>
-    <EditorialStatus xmlns="4873beb7-5857-4685-be1f-d57550cc96cc">Complete</EditorialStatus>
-    <LastModifiedDateTime xmlns="4873beb7-5857-4685-be1f-d57550cc96cc" xsi:nil="true"/>
-    <ScenarioTagsTaxHTField0 xmlns="4873beb7-5857-4685-be1f-d57550cc96cc">
-      <Terms xmlns="http://schemas.microsoft.com/office/infopath/2007/PartnerControls"/>
-    </ScenarioTagsTaxHTField0>
-    <LocProcessedForMarketsLookup xmlns="4873beb7-5857-4685-be1f-d57550cc96cc" xsi:nil="true"/>
-    <TPLaunchHelpLinkType xmlns="4873beb7-5857-4685-be1f-d57550cc96cc">Template</TPLaunchHelpLinkType>
-    <OriginalRelease xmlns="4873beb7-5857-4685-be1f-d57550cc96cc">15</OriginalRelease>
-    <LocalizationTagsTaxHTField0 xmlns="4873beb7-5857-4685-be1f-d57550cc96cc">
-      <Terms xmlns="http://schemas.microsoft.com/office/infopath/2007/PartnerControls"/>
-    </LocalizationTagsTaxHTField0>
-    <UACurrentWords xmlns="4873beb7-5857-4685-be1f-d57550cc96cc" xsi:nil="true"/>
-    <ArtSampleDocs xmlns="4873beb7-5857-4685-be1f-d57550cc96cc" xsi:nil="true"/>
-    <UALocRecommendation xmlns="4873beb7-5857-4685-be1f-d57550cc96cc">Localize</UALocRecommendation>
-    <Manager xmlns="4873beb7-5857-4685-be1f-d57550cc96cc" xsi:nil="true"/>
-    <LocOverallHandbackStatusLookup xmlns="4873beb7-5857-4685-be1f-d57550cc96cc" xsi:nil="true"/>
-    <ShowIn xmlns="4873beb7-5857-4685-be1f-d57550cc96cc">Show everywhere</ShowIn>
-    <UANotes xmlns="4873beb7-5857-4685-be1f-d57550cc96cc" xsi:nil="true"/>
-    <InternalTagsTaxHTField0 xmlns="4873beb7-5857-4685-be1f-d57550cc96cc">
-      <Terms xmlns="http://schemas.microsoft.com/office/infopath/2007/PartnerControls"/>
-    </InternalTagsTaxHTField0>
-    <CSXHash xmlns="4873beb7-5857-4685-be1f-d57550cc96cc" xsi:nil="true"/>
-    <VoteCount xmlns="4873beb7-5857-4685-be1f-d57550cc96cc" xsi:nil="true"/>
-    <AssetExpire xmlns="4873beb7-5857-4685-be1f-d57550cc96cc">2029-05-12T07:00:00+00:00</AssetExpire>
-    <DSATActionTaken xmlns="4873beb7-5857-4685-be1f-d57550cc96cc" xsi:nil="true"/>
-    <CSXSubmissionMarket xmlns="4873beb7-5857-4685-be1f-d57550cc96cc" xsi:nil="true"/>
-    <LocMarketGroupTiers2 xmlns="4873beb7-5857-4685-be1f-d57550cc96cc" xsi:nil="true"/>
-  </documentManagement>
-</p:properties>
+<?mso-contentType ?>
+<FormTemplates xmlns="http://schemas.microsoft.com/sharepoint/v3/contenttype/forms">
+  <Display>DocumentLibraryForm</Display>
+  <Edit>AssetEditForm</Edit>
+  <New>DocumentLibraryForm</New>
+</FormTemplates>
 </file>
 
 <file path=customXml/itemProps1.xml><?xml version="1.0" encoding="utf-8"?>
-<ds:datastoreItem xmlns:ds="http://schemas.openxmlformats.org/officeDocument/2006/customXml" ds:itemID="{3836F65B-1B07-41EE-A0E8-BC6EF3855225}">
+<ds:datastoreItem xmlns:ds="http://schemas.openxmlformats.org/officeDocument/2006/customXml" ds:itemID="{60C67BEE-D13F-4BD2-98A5-34D8A0977F68}">
   <ds:schemaRefs>
-    <ds:schemaRef ds:uri="http://schemas.microsoft.com/sharepoint/v3/contenttype/forms"/>
+    <ds:schemaRef ds:uri="http://purl.org/dc/terms/"/>
+    <ds:schemaRef ds:uri="http://schemas.microsoft.com/office/infopath/2007/PartnerControls"/>
+    <ds:schemaRef ds:uri="4873beb7-5857-4685-be1f-d57550cc96cc"/>
+    <ds:schemaRef ds:uri="http://schemas.microsoft.com/office/2006/documentManagement/types"/>
+    <ds:schemaRef ds:uri="http://schemas.openxmlformats.org/package/2006/metadata/core-properties"/>
+    <ds:schemaRef ds:uri="http://www.w3.org/XML/1998/namespace"/>
+    <ds:schemaRef ds:uri="http://purl.org/dc/dcmitype/"/>
+    <ds:schemaRef ds:uri="http://schemas.microsoft.com/office/2006/metadata/properties"/>
+    <ds:schemaRef ds:uri="http://purl.org/dc/elements/1.1/"/>
   </ds:schemaRefs>
 </ds:datastoreItem>
 </file>
@@ -9140,17 +9386,9 @@
 </file>
 
 <file path=customXml/itemProps3.xml><?xml version="1.0" encoding="utf-8"?>
-<ds:datastoreItem xmlns:ds="http://schemas.openxmlformats.org/officeDocument/2006/customXml" ds:itemID="{60C67BEE-D13F-4BD2-98A5-34D8A0977F68}">
+<ds:datastoreItem xmlns:ds="http://schemas.openxmlformats.org/officeDocument/2006/customXml" ds:itemID="{3836F65B-1B07-41EE-A0E8-BC6EF3855225}">
   <ds:schemaRefs>
-    <ds:schemaRef ds:uri="http://purl.org/dc/terms/"/>
-    <ds:schemaRef ds:uri="http://schemas.microsoft.com/office/infopath/2007/PartnerControls"/>
-    <ds:schemaRef ds:uri="4873beb7-5857-4685-be1f-d57550cc96cc"/>
-    <ds:schemaRef ds:uri="http://schemas.microsoft.com/office/2006/documentManagement/types"/>
-    <ds:schemaRef ds:uri="http://schemas.openxmlformats.org/package/2006/metadata/core-properties"/>
-    <ds:schemaRef ds:uri="http://www.w3.org/XML/1998/namespace"/>
-    <ds:schemaRef ds:uri="http://purl.org/dc/dcmitype/"/>
-    <ds:schemaRef ds:uri="http://schemas.microsoft.com/office/2006/metadata/properties"/>
-    <ds:schemaRef ds:uri="http://purl.org/dc/elements/1.1/"/>
+    <ds:schemaRef ds:uri="http://schemas.microsoft.com/sharepoint/v3/contenttype/forms"/>
   </ds:schemaRefs>
 </ds:datastoreItem>
 </file>
</xml_diff>